<commit_message>
removed date which is not relevant anymore
</commit_message>
<xml_diff>
--- a/Lab Slides/03-Progress Update 1.pptx
+++ b/Lab Slides/03-Progress Update 1.pptx
@@ -9477,29 +9477,14 @@
               <a:buChar char="•"/>
             </a:pPr>
             <a:r>
-              <a:rPr lang="en-US" sz="2100" spc="-1" dirty="0">
+              <a:rPr lang="en-US" sz="2100" b="0" strike="noStrike" spc="-1">
                 <a:solidFill>
                   <a:srgbClr val="000000"/>
                 </a:solidFill>
                 <a:latin typeface="Calibri"/>
               </a:rPr>
-              <a:t>There won’t be a meeting on November 27.</a:t>
+              <a:t>For </a:t>
             </a:r>
-          </a:p>
-          <a:p>
-            <a:pPr marL="457200" indent="-361080">
-              <a:lnSpc>
-                <a:spcPct val="90000"/>
-              </a:lnSpc>
-              <a:spcBef>
-                <a:spcPts val="799"/>
-              </a:spcBef>
-              <a:buClr>
-                <a:srgbClr val="1F3864"/>
-              </a:buClr>
-              <a:buFont typeface="Arial"/>
-              <a:buChar char="•"/>
-            </a:pPr>
             <a:r>
               <a:rPr lang="en-US" sz="2100" b="0" strike="noStrike" spc="-1" dirty="0">
                 <a:solidFill>
@@ -9507,7 +9492,7 @@
                 </a:solidFill>
                 <a:latin typeface="Calibri"/>
               </a:rPr>
-              <a:t>For the meeting on </a:t>
+              <a:t>the meeting on </a:t>
             </a:r>
             <a:r>
               <a:rPr lang="en-US" sz="2100" b="0" strike="noStrike" spc="-1" dirty="0">
@@ -9601,16 +9586,7 @@
                 </a:solidFill>
                 <a:latin typeface="Calibri"/>
               </a:rPr>
-              <a:t>e will reduce the final presentations to </a:t>
-            </a:r>
-            <a:r>
-              <a:rPr lang="en-US" sz="2100" spc="-1">
-                <a:solidFill>
-                  <a:srgbClr val="FF0000"/>
-                </a:solidFill>
-                <a:latin typeface="Calibri"/>
-              </a:rPr>
-              <a:t>15 minutes!</a:t>
+              <a:t>e will reduce the final presentations to 15 minutes!</a:t>
             </a:r>
             <a:endParaRPr lang="en-US" sz="2100" b="0" strike="noStrike" spc="-1" dirty="0">
               <a:solidFill>

</xml_diff>